<commit_message>
small edit on pptx
</commit_message>
<xml_diff>
--- a/Dokumentation/Iteration1/I._Iteration_Praesentation.pptx
+++ b/Dokumentation/Iteration1/I._Iteration_Praesentation.pptx
@@ -118,6 +118,11 @@
       </a:defRPr>
     </a:lvl9pPr>
   </p:defaultTextStyle>
+  <p:extLst>
+    <p:ext uri="{EFAFB233-063F-42B5-8137-9DF3F51BA10A}">
+      <p15:sldGuideLst xmlns:p15="http://schemas.microsoft.com/office/powerpoint/2012/main"/>
+    </p:ext>
+  </p:extLst>
 </p:presentation>
 </file>
 
@@ -5488,11 +5493,11 @@
             <a:pPr algn="l"/>
             <a:r>
               <a:rPr lang="de-DE" dirty="0"/>
-              <a:t>Alisan </a:t>
+              <a:t>Dave </a:t>
             </a:r>
             <a:r>
               <a:rPr lang="de-DE" dirty="0" err="1"/>
-              <a:t>Gündogan</a:t>
+              <a:t>Makila</a:t>
             </a:r>
             <a:endParaRPr lang="de-DE" dirty="0"/>
           </a:p>

</xml_diff>